<commit_message>
added blue highlight for problem areas
</commit_message>
<xml_diff>
--- a/presentation-drp-plan/2DDRP-PresentationShanghai2018.pptx
+++ b/presentation-drp-plan/2DDRP-PresentationShanghai2018.pptx
@@ -8587,7 +8587,11 @@
           <a:p>
             <a:pPr lvl="1"/>
             <a:r>
-              <a:rPr lang="en-US" i="1" dirty="0"/>
+              <a:rPr lang="en-US" i="1" dirty="0">
+                <a:solidFill>
+                  <a:schemeClr val="accent1"/>
+                </a:solidFill>
+              </a:rPr>
               <a:t>Limited availability Feb-Mar 2019</a:t>
             </a:r>
           </a:p>
@@ -8604,7 +8608,11 @@
           <a:p>
             <a:pPr lvl="1"/>
             <a:r>
-              <a:rPr lang="en-US" i="1" dirty="0"/>
+              <a:rPr lang="en-US" i="1" dirty="0">
+                <a:solidFill>
+                  <a:schemeClr val="accent1"/>
+                </a:solidFill>
+              </a:rPr>
               <a:t>New developer – needs time to familiarize himself (ready ~Mar 2019)</a:t>
             </a:r>
           </a:p>

</xml_diff>

<commit_message>
removed Yabe-san as a developer. I believe that is correct..
</commit_message>
<xml_diff>
--- a/presentation-drp-plan/2DDRP-PresentationShanghai2018.pptx
+++ b/presentation-drp-plan/2DDRP-PresentationShanghai2018.pptx
@@ -8626,8 +8626,12 @@
               <a:t>Mineo</a:t>
             </a:r>
             <a:r>
+              <a:rPr lang="en-US"/>
+              <a:t>, Naoki </a:t>
+            </a:r>
+            <a:r>
               <a:rPr lang="en-US" dirty="0"/>
-              <a:t>, Kiyoto Yabe, Naoki Yasuda and Masayuki Tanaka (1D sky subtraction and flux </a:t>
+              <a:t>Yasuda and Masayuki Tanaka (1D sky subtraction and flux </a:t>
             </a:r>
             <a:r>
               <a:rPr lang="en-US" dirty="0" err="1"/>

</xml_diff>

<commit_message>
corrected SM1 installation marker and minor updates
</commit_message>
<xml_diff>
--- a/presentation-drp-plan/2DDRP-PresentationShanghai2018.pptx
+++ b/presentation-drp-plan/2DDRP-PresentationShanghai2018.pptx
@@ -11,15 +11,15 @@
     <p:sldId id="256" r:id="rId2"/>
     <p:sldId id="258" r:id="rId3"/>
     <p:sldId id="273" r:id="rId4"/>
-    <p:sldId id="268" r:id="rId5"/>
-    <p:sldId id="272" r:id="rId6"/>
-    <p:sldId id="271" r:id="rId7"/>
-    <p:sldId id="270" r:id="rId8"/>
-    <p:sldId id="269" r:id="rId9"/>
-    <p:sldId id="267" r:id="rId10"/>
-    <p:sldId id="266" r:id="rId11"/>
-    <p:sldId id="265" r:id="rId12"/>
-    <p:sldId id="264" r:id="rId13"/>
+    <p:sldId id="264" r:id="rId5"/>
+    <p:sldId id="281" r:id="rId6"/>
+    <p:sldId id="280" r:id="rId7"/>
+    <p:sldId id="279" r:id="rId8"/>
+    <p:sldId id="278" r:id="rId9"/>
+    <p:sldId id="277" r:id="rId10"/>
+    <p:sldId id="276" r:id="rId11"/>
+    <p:sldId id="275" r:id="rId12"/>
+    <p:sldId id="274" r:id="rId13"/>
     <p:sldId id="263" r:id="rId14"/>
   </p:sldIdLst>
   <p:sldSz cx="12192000" cy="6858000"/>
@@ -209,7 +209,7 @@
           <a:p>
             <a:fld id="{5496F661-0B70-1041-9ACE-2298B47CAF31}" type="datetimeFigureOut">
               <a:rPr lang="en-US" smtClean="0"/>
-              <a:t>12/5/18</a:t>
+              <a:t>12/7/18</a:t>
             </a:fld>
             <a:endParaRPr lang="en-US"/>
           </a:p>
@@ -623,7 +623,7 @@
           <a:p>
             <a:fld id="{69086952-CAC6-CF4D-9465-A154BD8714F1}" type="datetime1">
               <a:rPr lang="en-US" smtClean="0"/>
-              <a:t>12/5/18</a:t>
+              <a:t>12/7/18</a:t>
             </a:fld>
             <a:endParaRPr lang="en-US"/>
           </a:p>
@@ -824,7 +824,7 @@
           <a:p>
             <a:fld id="{55107D79-07F1-A141-BEDE-29F7891368E6}" type="datetime1">
               <a:rPr lang="en-US" smtClean="0"/>
-              <a:t>12/5/18</a:t>
+              <a:t>12/7/18</a:t>
             </a:fld>
             <a:endParaRPr lang="en-US"/>
           </a:p>
@@ -1035,7 +1035,7 @@
           <a:p>
             <a:fld id="{195D2B29-33BD-204B-8540-FAAA97736DF5}" type="datetime1">
               <a:rPr lang="en-US" smtClean="0"/>
-              <a:t>12/5/18</a:t>
+              <a:t>12/7/18</a:t>
             </a:fld>
             <a:endParaRPr lang="en-US"/>
           </a:p>
@@ -1236,7 +1236,7 @@
           <a:p>
             <a:fld id="{6ED2B688-8491-3043-A4B5-7828E86AFA54}" type="datetime1">
               <a:rPr lang="en-US" smtClean="0"/>
-              <a:t>12/5/18</a:t>
+              <a:t>12/7/18</a:t>
             </a:fld>
             <a:endParaRPr lang="en-US"/>
           </a:p>
@@ -1514,7 +1514,7 @@
           <a:p>
             <a:fld id="{F7A24549-CB4E-0441-83D6-CA78B36D78CD}" type="datetime1">
               <a:rPr lang="en-US" smtClean="0"/>
-              <a:t>12/5/18</a:t>
+              <a:t>12/7/18</a:t>
             </a:fld>
             <a:endParaRPr lang="en-US"/>
           </a:p>
@@ -1782,7 +1782,7 @@
           <a:p>
             <a:fld id="{3AB9C1F8-7152-7E40-889E-24790B84D901}" type="datetime1">
               <a:rPr lang="en-US" smtClean="0"/>
-              <a:t>12/5/18</a:t>
+              <a:t>12/7/18</a:t>
             </a:fld>
             <a:endParaRPr lang="en-US"/>
           </a:p>
@@ -2197,7 +2197,7 @@
           <a:p>
             <a:fld id="{6918BD15-09A4-0C4C-8C9E-0CBBBB7D8FCB}" type="datetime1">
               <a:rPr lang="en-US" smtClean="0"/>
-              <a:t>12/5/18</a:t>
+              <a:t>12/7/18</a:t>
             </a:fld>
             <a:endParaRPr lang="en-US"/>
           </a:p>
@@ -2341,7 +2341,7 @@
           <a:p>
             <a:fld id="{62C3E1CC-7D62-C14A-9BB5-18A924F2BF6F}" type="datetime1">
               <a:rPr lang="en-US" smtClean="0"/>
-              <a:t>12/5/18</a:t>
+              <a:t>12/7/18</a:t>
             </a:fld>
             <a:endParaRPr lang="en-US"/>
           </a:p>
@@ -2457,7 +2457,7 @@
           <a:p>
             <a:fld id="{9735313B-6D99-7143-B70F-8E0BA3F4CF12}" type="datetime1">
               <a:rPr lang="en-US" smtClean="0"/>
-              <a:t>12/5/18</a:t>
+              <a:t>12/7/18</a:t>
             </a:fld>
             <a:endParaRPr lang="en-US"/>
           </a:p>
@@ -2771,7 +2771,7 @@
           <a:p>
             <a:fld id="{24E6CBC3-F0E0-9D4E-928C-73ADB3AEA8C5}" type="datetime1">
               <a:rPr lang="en-US" smtClean="0"/>
-              <a:t>12/5/18</a:t>
+              <a:t>12/7/18</a:t>
             </a:fld>
             <a:endParaRPr lang="en-US"/>
           </a:p>
@@ -3062,7 +3062,7 @@
           <a:p>
             <a:fld id="{248A045A-0214-F149-9248-5D63F084EB99}" type="datetime1">
               <a:rPr lang="en-US" smtClean="0"/>
-              <a:t>12/5/18</a:t>
+              <a:t>12/7/18</a:t>
             </a:fld>
             <a:endParaRPr lang="en-US"/>
           </a:p>
@@ -3306,7 +3306,7 @@
           <a:p>
             <a:fld id="{D6906B7D-D171-1642-ABAA-377D5C8C8D22}" type="datetime1">
               <a:rPr lang="en-US" smtClean="0"/>
-              <a:t>12/5/18</a:t>
+              <a:t>12/7/18</a:t>
             </a:fld>
             <a:endParaRPr lang="en-US"/>
           </a:p>
@@ -6080,10 +6080,132 @@
           </p:txBody>
         </p:sp>
       </p:grpSp>
+      <p:grpSp>
+        <p:nvGrpSpPr>
+          <p:cNvPr id="50" name="Group 49">
+            <a:extLst>
+              <a:ext uri="{FF2B5EF4-FFF2-40B4-BE49-F238E27FC236}">
+                <a16:creationId xmlns:a16="http://schemas.microsoft.com/office/drawing/2014/main" id="{E24CDCE6-0D93-FD4B-9087-66B88C42CC31}"/>
+              </a:ext>
+            </a:extLst>
+          </p:cNvPr>
+          <p:cNvGrpSpPr/>
+          <p:nvPr/>
+        </p:nvGrpSpPr>
+        <p:grpSpPr>
+          <a:xfrm>
+            <a:off x="3589739" y="32910"/>
+            <a:ext cx="634823" cy="528612"/>
+            <a:chOff x="4970187" y="25451"/>
+            <a:chExt cx="923060" cy="528612"/>
+          </a:xfrm>
+        </p:grpSpPr>
+        <p:sp>
+          <p:nvSpPr>
+            <p:cNvPr id="51" name="Rounded Rectangle 50">
+              <a:extLst>
+                <a:ext uri="{FF2B5EF4-FFF2-40B4-BE49-F238E27FC236}">
+                  <a16:creationId xmlns:a16="http://schemas.microsoft.com/office/drawing/2014/main" id="{0EDEBD5B-391C-B841-A734-2894518CF9D7}"/>
+                </a:ext>
+              </a:extLst>
+            </p:cNvPr>
+            <p:cNvSpPr/>
+            <p:nvPr/>
+          </p:nvSpPr>
+          <p:spPr>
+            <a:xfrm>
+              <a:off x="4970187" y="25451"/>
+              <a:ext cx="923060" cy="402000"/>
+            </a:xfrm>
+            <a:prstGeom prst="roundRect">
+              <a:avLst/>
+            </a:prstGeom>
+            <a:noFill/>
+          </p:spPr>
+          <p:style>
+            <a:lnRef idx="2">
+              <a:schemeClr val="accent1">
+                <a:shade val="50000"/>
+              </a:schemeClr>
+            </a:lnRef>
+            <a:fillRef idx="1">
+              <a:schemeClr val="accent1"/>
+            </a:fillRef>
+            <a:effectRef idx="0">
+              <a:schemeClr val="accent1"/>
+            </a:effectRef>
+            <a:fontRef idx="minor">
+              <a:schemeClr val="lt1"/>
+            </a:fontRef>
+          </p:style>
+          <p:txBody>
+            <a:bodyPr rtlCol="0" anchor="ctr"/>
+            <a:lstStyle/>
+            <a:p>
+              <a:pPr algn="ctr"/>
+              <a:r>
+                <a:rPr lang="en-US" sz="1400" dirty="0">
+                  <a:solidFill>
+                    <a:schemeClr val="tx1"/>
+                  </a:solidFill>
+                </a:rPr>
+                <a:t>SM1</a:t>
+              </a:r>
+            </a:p>
+          </p:txBody>
+        </p:sp>
+        <p:cxnSp>
+          <p:nvCxnSpPr>
+            <p:cNvPr id="52" name="Straight Arrow Connector 51">
+              <a:extLst>
+                <a:ext uri="{FF2B5EF4-FFF2-40B4-BE49-F238E27FC236}">
+                  <a16:creationId xmlns:a16="http://schemas.microsoft.com/office/drawing/2014/main" id="{7A4C1EDC-A380-084A-98DD-AE7A5EA2B081}"/>
+                </a:ext>
+              </a:extLst>
+            </p:cNvPr>
+            <p:cNvCxnSpPr>
+              <a:cxnSpLocks/>
+              <a:stCxn id="51" idx="2"/>
+            </p:cNvCxnSpPr>
+            <p:nvPr/>
+          </p:nvCxnSpPr>
+          <p:spPr>
+            <a:xfrm>
+              <a:off x="5431718" y="427451"/>
+              <a:ext cx="0" cy="126612"/>
+            </a:xfrm>
+            <a:prstGeom prst="straightConnector1">
+              <a:avLst/>
+            </a:prstGeom>
+            <a:ln>
+              <a:solidFill>
+                <a:schemeClr val="accent1">
+                  <a:lumMod val="50000"/>
+                </a:schemeClr>
+              </a:solidFill>
+              <a:tailEnd type="triangle"/>
+            </a:ln>
+          </p:spPr>
+          <p:style>
+            <a:lnRef idx="1">
+              <a:schemeClr val="accent1"/>
+            </a:lnRef>
+            <a:fillRef idx="0">
+              <a:schemeClr val="accent1"/>
+            </a:fillRef>
+            <a:effectRef idx="0">
+              <a:schemeClr val="accent1"/>
+            </a:effectRef>
+            <a:fontRef idx="minor">
+              <a:schemeClr val="tx1"/>
+            </a:fontRef>
+          </p:style>
+        </p:cxnSp>
+      </p:grpSp>
     </p:spTree>
     <p:extLst>
       <p:ext uri="{BB962C8B-B14F-4D97-AF65-F5344CB8AC3E}">
-        <p14:creationId xmlns:p14="http://schemas.microsoft.com/office/powerpoint/2010/main" val="3416760266"/>
+        <p14:creationId xmlns:p14="http://schemas.microsoft.com/office/powerpoint/2010/main" val="4166494708"/>
       </p:ext>
     </p:extLst>
   </p:cSld>
@@ -8569,10 +8691,132 @@
           </p:txBody>
         </p:sp>
       </p:grpSp>
+      <p:grpSp>
+        <p:nvGrpSpPr>
+          <p:cNvPr id="50" name="Group 49">
+            <a:extLst>
+              <a:ext uri="{FF2B5EF4-FFF2-40B4-BE49-F238E27FC236}">
+                <a16:creationId xmlns:a16="http://schemas.microsoft.com/office/drawing/2014/main" id="{E24CDCE6-0D93-FD4B-9087-66B88C42CC31}"/>
+              </a:ext>
+            </a:extLst>
+          </p:cNvPr>
+          <p:cNvGrpSpPr/>
+          <p:nvPr/>
+        </p:nvGrpSpPr>
+        <p:grpSpPr>
+          <a:xfrm>
+            <a:off x="3589739" y="32910"/>
+            <a:ext cx="634823" cy="528612"/>
+            <a:chOff x="4970187" y="25451"/>
+            <a:chExt cx="923060" cy="528612"/>
+          </a:xfrm>
+        </p:grpSpPr>
+        <p:sp>
+          <p:nvSpPr>
+            <p:cNvPr id="51" name="Rounded Rectangle 50">
+              <a:extLst>
+                <a:ext uri="{FF2B5EF4-FFF2-40B4-BE49-F238E27FC236}">
+                  <a16:creationId xmlns:a16="http://schemas.microsoft.com/office/drawing/2014/main" id="{0EDEBD5B-391C-B841-A734-2894518CF9D7}"/>
+                </a:ext>
+              </a:extLst>
+            </p:cNvPr>
+            <p:cNvSpPr/>
+            <p:nvPr/>
+          </p:nvSpPr>
+          <p:spPr>
+            <a:xfrm>
+              <a:off x="4970187" y="25451"/>
+              <a:ext cx="923060" cy="402000"/>
+            </a:xfrm>
+            <a:prstGeom prst="roundRect">
+              <a:avLst/>
+            </a:prstGeom>
+            <a:noFill/>
+          </p:spPr>
+          <p:style>
+            <a:lnRef idx="2">
+              <a:schemeClr val="accent1">
+                <a:shade val="50000"/>
+              </a:schemeClr>
+            </a:lnRef>
+            <a:fillRef idx="1">
+              <a:schemeClr val="accent1"/>
+            </a:fillRef>
+            <a:effectRef idx="0">
+              <a:schemeClr val="accent1"/>
+            </a:effectRef>
+            <a:fontRef idx="minor">
+              <a:schemeClr val="lt1"/>
+            </a:fontRef>
+          </p:style>
+          <p:txBody>
+            <a:bodyPr rtlCol="0" anchor="ctr"/>
+            <a:lstStyle/>
+            <a:p>
+              <a:pPr algn="ctr"/>
+              <a:r>
+                <a:rPr lang="en-US" sz="1400" dirty="0">
+                  <a:solidFill>
+                    <a:schemeClr val="tx1"/>
+                  </a:solidFill>
+                </a:rPr>
+                <a:t>SM1</a:t>
+              </a:r>
+            </a:p>
+          </p:txBody>
+        </p:sp>
+        <p:cxnSp>
+          <p:nvCxnSpPr>
+            <p:cNvPr id="52" name="Straight Arrow Connector 51">
+              <a:extLst>
+                <a:ext uri="{FF2B5EF4-FFF2-40B4-BE49-F238E27FC236}">
+                  <a16:creationId xmlns:a16="http://schemas.microsoft.com/office/drawing/2014/main" id="{7A4C1EDC-A380-084A-98DD-AE7A5EA2B081}"/>
+                </a:ext>
+              </a:extLst>
+            </p:cNvPr>
+            <p:cNvCxnSpPr>
+              <a:cxnSpLocks/>
+              <a:stCxn id="51" idx="2"/>
+            </p:cNvCxnSpPr>
+            <p:nvPr/>
+          </p:nvCxnSpPr>
+          <p:spPr>
+            <a:xfrm>
+              <a:off x="5431718" y="427451"/>
+              <a:ext cx="0" cy="126612"/>
+            </a:xfrm>
+            <a:prstGeom prst="straightConnector1">
+              <a:avLst/>
+            </a:prstGeom>
+            <a:ln>
+              <a:solidFill>
+                <a:schemeClr val="accent1">
+                  <a:lumMod val="50000"/>
+                </a:schemeClr>
+              </a:solidFill>
+              <a:tailEnd type="triangle"/>
+            </a:ln>
+          </p:spPr>
+          <p:style>
+            <a:lnRef idx="1">
+              <a:schemeClr val="accent1"/>
+            </a:lnRef>
+            <a:fillRef idx="0">
+              <a:schemeClr val="accent1"/>
+            </a:fillRef>
+            <a:effectRef idx="0">
+              <a:schemeClr val="accent1"/>
+            </a:effectRef>
+            <a:fontRef idx="minor">
+              <a:schemeClr val="tx1"/>
+            </a:fontRef>
+          </p:style>
+        </p:cxnSp>
+      </p:grpSp>
     </p:spTree>
     <p:extLst>
       <p:ext uri="{BB962C8B-B14F-4D97-AF65-F5344CB8AC3E}">
-        <p14:creationId xmlns:p14="http://schemas.microsoft.com/office/powerpoint/2010/main" val="2807869750"/>
+        <p14:creationId xmlns:p14="http://schemas.microsoft.com/office/powerpoint/2010/main" val="3213365350"/>
       </p:ext>
     </p:extLst>
   </p:cSld>
@@ -11235,10 +11479,132 @@
           </p:txBody>
         </p:sp>
       </p:grpSp>
+      <p:grpSp>
+        <p:nvGrpSpPr>
+          <p:cNvPr id="50" name="Group 49">
+            <a:extLst>
+              <a:ext uri="{FF2B5EF4-FFF2-40B4-BE49-F238E27FC236}">
+                <a16:creationId xmlns:a16="http://schemas.microsoft.com/office/drawing/2014/main" id="{E24CDCE6-0D93-FD4B-9087-66B88C42CC31}"/>
+              </a:ext>
+            </a:extLst>
+          </p:cNvPr>
+          <p:cNvGrpSpPr/>
+          <p:nvPr/>
+        </p:nvGrpSpPr>
+        <p:grpSpPr>
+          <a:xfrm>
+            <a:off x="3589739" y="32910"/>
+            <a:ext cx="634823" cy="528612"/>
+            <a:chOff x="4970187" y="25451"/>
+            <a:chExt cx="923060" cy="528612"/>
+          </a:xfrm>
+        </p:grpSpPr>
+        <p:sp>
+          <p:nvSpPr>
+            <p:cNvPr id="51" name="Rounded Rectangle 50">
+              <a:extLst>
+                <a:ext uri="{FF2B5EF4-FFF2-40B4-BE49-F238E27FC236}">
+                  <a16:creationId xmlns:a16="http://schemas.microsoft.com/office/drawing/2014/main" id="{0EDEBD5B-391C-B841-A734-2894518CF9D7}"/>
+                </a:ext>
+              </a:extLst>
+            </p:cNvPr>
+            <p:cNvSpPr/>
+            <p:nvPr/>
+          </p:nvSpPr>
+          <p:spPr>
+            <a:xfrm>
+              <a:off x="4970187" y="25451"/>
+              <a:ext cx="923060" cy="402000"/>
+            </a:xfrm>
+            <a:prstGeom prst="roundRect">
+              <a:avLst/>
+            </a:prstGeom>
+            <a:noFill/>
+          </p:spPr>
+          <p:style>
+            <a:lnRef idx="2">
+              <a:schemeClr val="accent1">
+                <a:shade val="50000"/>
+              </a:schemeClr>
+            </a:lnRef>
+            <a:fillRef idx="1">
+              <a:schemeClr val="accent1"/>
+            </a:fillRef>
+            <a:effectRef idx="0">
+              <a:schemeClr val="accent1"/>
+            </a:effectRef>
+            <a:fontRef idx="minor">
+              <a:schemeClr val="lt1"/>
+            </a:fontRef>
+          </p:style>
+          <p:txBody>
+            <a:bodyPr rtlCol="0" anchor="ctr"/>
+            <a:lstStyle/>
+            <a:p>
+              <a:pPr algn="ctr"/>
+              <a:r>
+                <a:rPr lang="en-US" sz="1400" dirty="0">
+                  <a:solidFill>
+                    <a:schemeClr val="tx1"/>
+                  </a:solidFill>
+                </a:rPr>
+                <a:t>SM1</a:t>
+              </a:r>
+            </a:p>
+          </p:txBody>
+        </p:sp>
+        <p:cxnSp>
+          <p:nvCxnSpPr>
+            <p:cNvPr id="52" name="Straight Arrow Connector 51">
+              <a:extLst>
+                <a:ext uri="{FF2B5EF4-FFF2-40B4-BE49-F238E27FC236}">
+                  <a16:creationId xmlns:a16="http://schemas.microsoft.com/office/drawing/2014/main" id="{7A4C1EDC-A380-084A-98DD-AE7A5EA2B081}"/>
+                </a:ext>
+              </a:extLst>
+            </p:cNvPr>
+            <p:cNvCxnSpPr>
+              <a:cxnSpLocks/>
+              <a:stCxn id="51" idx="2"/>
+            </p:cNvCxnSpPr>
+            <p:nvPr/>
+          </p:nvCxnSpPr>
+          <p:spPr>
+            <a:xfrm>
+              <a:off x="5431718" y="427451"/>
+              <a:ext cx="0" cy="126612"/>
+            </a:xfrm>
+            <a:prstGeom prst="straightConnector1">
+              <a:avLst/>
+            </a:prstGeom>
+            <a:ln>
+              <a:solidFill>
+                <a:schemeClr val="accent1">
+                  <a:lumMod val="50000"/>
+                </a:schemeClr>
+              </a:solidFill>
+              <a:tailEnd type="triangle"/>
+            </a:ln>
+          </p:spPr>
+          <p:style>
+            <a:lnRef idx="1">
+              <a:schemeClr val="accent1"/>
+            </a:lnRef>
+            <a:fillRef idx="0">
+              <a:schemeClr val="accent1"/>
+            </a:fillRef>
+            <a:effectRef idx="0">
+              <a:schemeClr val="accent1"/>
+            </a:effectRef>
+            <a:fontRef idx="minor">
+              <a:schemeClr val="tx1"/>
+            </a:fontRef>
+          </p:style>
+        </p:cxnSp>
+      </p:grpSp>
     </p:spTree>
     <p:extLst>
       <p:ext uri="{BB962C8B-B14F-4D97-AF65-F5344CB8AC3E}">
-        <p14:creationId xmlns:p14="http://schemas.microsoft.com/office/powerpoint/2010/main" val="1054614681"/>
+        <p14:creationId xmlns:p14="http://schemas.microsoft.com/office/powerpoint/2010/main" val="2159504952"/>
       </p:ext>
     </p:extLst>
   </p:cSld>
@@ -11438,7 +11804,7 @@
           <a:p>
             <a:fld id="{2C23AB44-DFF8-A644-9349-9D0F869EC52A}" type="datetime1">
               <a:rPr lang="en-US" smtClean="0"/>
-              <a:t>12/5/18</a:t>
+              <a:t>12/7/18</a:t>
             </a:fld>
             <a:endParaRPr lang="en-US"/>
           </a:p>
@@ -12032,7 +12398,7 @@
         <p:spPr>
           <a:xfrm>
             <a:off x="10390093" y="3847763"/>
-            <a:ext cx="1665058" cy="1123384"/>
+            <a:ext cx="1665058" cy="1461939"/>
           </a:xfrm>
           <a:prstGeom prst="rect">
             <a:avLst/>
@@ -12072,6 +12438,16 @@
             <a:r>
               <a:rPr lang="en-US" sz="1100" dirty="0"/>
               <a:t>Line fluxes/equivalent widths</a:t>
+            </a:r>
+          </a:p>
+          <a:p>
+            <a:pPr marL="285750" indent="-285750">
+              <a:buFont typeface="Arial" panose="020B0604020202020204" pitchFamily="34" charset="0"/>
+              <a:buChar char="•"/>
+            </a:pPr>
+            <a:r>
+              <a:rPr lang="en-US" sz="1100" dirty="0"/>
+              <a:t>star-galaxy separation</a:t>
             </a:r>
           </a:p>
           <a:p>
@@ -12524,7 +12900,7 @@
           <a:p>
             <a:fld id="{698D979F-A9E8-3F4B-A4C3-0E81195F12DC}" type="datetime1">
               <a:rPr lang="en-US" smtClean="0"/>
-              <a:t>12/5/18</a:t>
+              <a:t>12/7/18</a:t>
             </a:fld>
             <a:endParaRPr lang="en-US"/>
           </a:p>
@@ -12668,7 +13044,7 @@
           <a:p>
             <a:fld id="{6ED2B688-8491-3043-A4B5-7828E86AFA54}" type="datetime1">
               <a:rPr lang="en-US" smtClean="0"/>
-              <a:t>12/5/18</a:t>
+              <a:t>12/7/18</a:t>
             </a:fld>
             <a:endParaRPr lang="en-US"/>
           </a:p>
@@ -14138,134 +14514,6 @@
       </p:sp>
       <p:sp>
         <p:nvSpPr>
-          <p:cNvPr id="34" name="Rectangle 33">
-            <a:extLst>
-              <a:ext uri="{FF2B5EF4-FFF2-40B4-BE49-F238E27FC236}">
-                <a16:creationId xmlns:a16="http://schemas.microsoft.com/office/drawing/2014/main" id="{2F09A821-2D7E-BA42-A432-51B94DD10029}"/>
-              </a:ext>
-            </a:extLst>
-          </p:cNvPr>
-          <p:cNvSpPr/>
-          <p:nvPr/>
-        </p:nvSpPr>
-        <p:spPr>
-          <a:xfrm>
-            <a:off x="1514661" y="2114887"/>
-            <a:ext cx="988807" cy="247188"/>
-          </a:xfrm>
-          <a:prstGeom prst="rect">
-            <a:avLst/>
-          </a:prstGeom>
-          <a:solidFill>
-            <a:schemeClr val="bg1"/>
-          </a:solidFill>
-          <a:ln>
-            <a:solidFill>
-              <a:schemeClr val="accent1"/>
-            </a:solidFill>
-          </a:ln>
-        </p:spPr>
-        <p:style>
-          <a:lnRef idx="2">
-            <a:schemeClr val="accent1">
-              <a:shade val="50000"/>
-            </a:schemeClr>
-          </a:lnRef>
-          <a:fillRef idx="1">
-            <a:schemeClr val="accent1"/>
-          </a:fillRef>
-          <a:effectRef idx="0">
-            <a:schemeClr val="accent1"/>
-          </a:effectRef>
-          <a:fontRef idx="minor">
-            <a:schemeClr val="lt1"/>
-          </a:fontRef>
-        </p:style>
-        <p:txBody>
-          <a:bodyPr rtlCol="0" anchor="ctr">
-            <a:normAutofit fontScale="92500" lnSpcReduction="10000"/>
-          </a:bodyPr>
-          <a:lstStyle/>
-          <a:p>
-            <a:pPr algn="ctr"/>
-            <a:r>
-              <a:rPr lang="en-US" sz="1200" dirty="0">
-                <a:solidFill>
-                  <a:schemeClr val="tx1"/>
-                </a:solidFill>
-              </a:rPr>
-              <a:t>Dark</a:t>
-            </a:r>
-            <a:endParaRPr lang="en-US" sz="900" dirty="0"/>
-          </a:p>
-        </p:txBody>
-      </p:sp>
-      <p:sp>
-        <p:nvSpPr>
-          <p:cNvPr id="35" name="Rectangle 34">
-            <a:extLst>
-              <a:ext uri="{FF2B5EF4-FFF2-40B4-BE49-F238E27FC236}">
-                <a16:creationId xmlns:a16="http://schemas.microsoft.com/office/drawing/2014/main" id="{6A8B4C42-5257-1E44-9DE5-6EA614BEAB03}"/>
-              </a:ext>
-            </a:extLst>
-          </p:cNvPr>
-          <p:cNvSpPr/>
-          <p:nvPr/>
-        </p:nvSpPr>
-        <p:spPr>
-          <a:xfrm>
-            <a:off x="1508717" y="2356382"/>
-            <a:ext cx="991459" cy="247188"/>
-          </a:xfrm>
-          <a:prstGeom prst="rect">
-            <a:avLst/>
-          </a:prstGeom>
-          <a:solidFill>
-            <a:schemeClr val="bg1"/>
-          </a:solidFill>
-          <a:ln>
-            <a:solidFill>
-              <a:schemeClr val="accent1"/>
-            </a:solidFill>
-          </a:ln>
-        </p:spPr>
-        <p:style>
-          <a:lnRef idx="2">
-            <a:schemeClr val="accent1">
-              <a:shade val="50000"/>
-            </a:schemeClr>
-          </a:lnRef>
-          <a:fillRef idx="1">
-            <a:schemeClr val="accent1"/>
-          </a:fillRef>
-          <a:effectRef idx="0">
-            <a:schemeClr val="accent1"/>
-          </a:effectRef>
-          <a:fontRef idx="minor">
-            <a:schemeClr val="lt1"/>
-          </a:fontRef>
-        </p:style>
-        <p:txBody>
-          <a:bodyPr rtlCol="0" anchor="ctr">
-            <a:normAutofit fontScale="92500" lnSpcReduction="10000"/>
-          </a:bodyPr>
-          <a:lstStyle/>
-          <a:p>
-            <a:pPr algn="ctr"/>
-            <a:r>
-              <a:rPr lang="en-US" sz="1200" dirty="0" err="1">
-                <a:solidFill>
-                  <a:schemeClr val="tx1"/>
-                </a:solidFill>
-              </a:rPr>
-              <a:t>FiberFlat</a:t>
-            </a:r>
-            <a:endParaRPr lang="en-US" sz="900" dirty="0"/>
-          </a:p>
-        </p:txBody>
-      </p:sp>
-      <p:sp>
-        <p:nvSpPr>
           <p:cNvPr id="36" name="Right Bracket 35">
             <a:extLst>
               <a:ext uri="{FF2B5EF4-FFF2-40B4-BE49-F238E27FC236}">
@@ -14730,6 +14978,134 @@
           </a:fontRef>
         </p:style>
       </p:cxnSp>
+      <p:sp>
+        <p:nvSpPr>
+          <p:cNvPr id="44" name="Rectangle 43">
+            <a:extLst>
+              <a:ext uri="{FF2B5EF4-FFF2-40B4-BE49-F238E27FC236}">
+                <a16:creationId xmlns:a16="http://schemas.microsoft.com/office/drawing/2014/main" id="{7F8B6D8F-A229-B84C-AFFE-100F35D57D20}"/>
+              </a:ext>
+            </a:extLst>
+          </p:cNvPr>
+          <p:cNvSpPr/>
+          <p:nvPr/>
+        </p:nvSpPr>
+        <p:spPr>
+          <a:xfrm>
+            <a:off x="1514661" y="2117867"/>
+            <a:ext cx="985515" cy="247188"/>
+          </a:xfrm>
+          <a:prstGeom prst="rect">
+            <a:avLst/>
+          </a:prstGeom>
+          <a:solidFill>
+            <a:schemeClr val="bg1"/>
+          </a:solidFill>
+          <a:ln>
+            <a:solidFill>
+              <a:schemeClr val="accent1"/>
+            </a:solidFill>
+          </a:ln>
+        </p:spPr>
+        <p:style>
+          <a:lnRef idx="2">
+            <a:schemeClr val="accent1">
+              <a:shade val="50000"/>
+            </a:schemeClr>
+          </a:lnRef>
+          <a:fillRef idx="1">
+            <a:schemeClr val="accent1"/>
+          </a:fillRef>
+          <a:effectRef idx="0">
+            <a:schemeClr val="accent1"/>
+          </a:effectRef>
+          <a:fontRef idx="minor">
+            <a:schemeClr val="lt1"/>
+          </a:fontRef>
+        </p:style>
+        <p:txBody>
+          <a:bodyPr rtlCol="0" anchor="ctr">
+            <a:normAutofit fontScale="92500" lnSpcReduction="10000"/>
+          </a:bodyPr>
+          <a:lstStyle/>
+          <a:p>
+            <a:pPr algn="ctr"/>
+            <a:r>
+              <a:rPr lang="en-US" sz="1200" dirty="0">
+                <a:solidFill>
+                  <a:schemeClr val="tx1"/>
+                </a:solidFill>
+              </a:rPr>
+              <a:t>Dark</a:t>
+            </a:r>
+            <a:endParaRPr lang="en-US" sz="900" dirty="0"/>
+          </a:p>
+        </p:txBody>
+      </p:sp>
+      <p:sp>
+        <p:nvSpPr>
+          <p:cNvPr id="45" name="Rectangle 44">
+            <a:extLst>
+              <a:ext uri="{FF2B5EF4-FFF2-40B4-BE49-F238E27FC236}">
+                <a16:creationId xmlns:a16="http://schemas.microsoft.com/office/drawing/2014/main" id="{5706AFBE-505C-F742-B9F8-EB0587622258}"/>
+              </a:ext>
+            </a:extLst>
+          </p:cNvPr>
+          <p:cNvSpPr/>
+          <p:nvPr/>
+        </p:nvSpPr>
+        <p:spPr>
+          <a:xfrm>
+            <a:off x="1514661" y="2355992"/>
+            <a:ext cx="985515" cy="247188"/>
+          </a:xfrm>
+          <a:prstGeom prst="rect">
+            <a:avLst/>
+          </a:prstGeom>
+          <a:solidFill>
+            <a:schemeClr val="bg1"/>
+          </a:solidFill>
+          <a:ln>
+            <a:solidFill>
+              <a:schemeClr val="accent1"/>
+            </a:solidFill>
+          </a:ln>
+        </p:spPr>
+        <p:style>
+          <a:lnRef idx="2">
+            <a:schemeClr val="accent1">
+              <a:shade val="50000"/>
+            </a:schemeClr>
+          </a:lnRef>
+          <a:fillRef idx="1">
+            <a:schemeClr val="accent1"/>
+          </a:fillRef>
+          <a:effectRef idx="0">
+            <a:schemeClr val="accent1"/>
+          </a:effectRef>
+          <a:fontRef idx="minor">
+            <a:schemeClr val="lt1"/>
+          </a:fontRef>
+        </p:style>
+        <p:txBody>
+          <a:bodyPr rtlCol="0" anchor="ctr">
+            <a:normAutofit fontScale="92500" lnSpcReduction="10000"/>
+          </a:bodyPr>
+          <a:lstStyle/>
+          <a:p>
+            <a:pPr algn="ctr"/>
+            <a:r>
+              <a:rPr lang="en-US" sz="1200" dirty="0" err="1">
+                <a:solidFill>
+                  <a:schemeClr val="tx1"/>
+                </a:solidFill>
+              </a:rPr>
+              <a:t>FiberFlat</a:t>
+            </a:r>
+            <a:endParaRPr lang="en-US" sz="900" dirty="0"/>
+          </a:p>
+        </p:txBody>
+      </p:sp>
     </p:spTree>
     <p:extLst>
       <p:ext uri="{BB962C8B-B14F-4D97-AF65-F5344CB8AC3E}">
@@ -15751,10 +16127,10 @@
       </p:grpSp>
       <p:grpSp>
         <p:nvGrpSpPr>
-          <p:cNvPr id="39" name="Group 38">
-            <a:extLst>
-              <a:ext uri="{FF2B5EF4-FFF2-40B4-BE49-F238E27FC236}">
-                <a16:creationId xmlns:a16="http://schemas.microsoft.com/office/drawing/2014/main" id="{D1187A3E-81E8-C345-A46B-027891B5EBB0}"/>
+          <p:cNvPr id="50" name="Group 49">
+            <a:extLst>
+              <a:ext uri="{FF2B5EF4-FFF2-40B4-BE49-F238E27FC236}">
+                <a16:creationId xmlns:a16="http://schemas.microsoft.com/office/drawing/2014/main" id="{E24CDCE6-0D93-FD4B-9087-66B88C42CC31}"/>
               </a:ext>
             </a:extLst>
           </p:cNvPr>
@@ -15763,7 +16139,7 @@
         </p:nvGrpSpPr>
         <p:grpSpPr>
           <a:xfrm>
-            <a:off x="3518489" y="32910"/>
+            <a:off x="3589739" y="32910"/>
             <a:ext cx="634823" cy="528612"/>
             <a:chOff x="4970187" y="25451"/>
             <a:chExt cx="923060" cy="528612"/>
@@ -15771,10 +16147,10 @@
         </p:grpSpPr>
         <p:sp>
           <p:nvSpPr>
-            <p:cNvPr id="40" name="Rounded Rectangle 39">
+            <p:cNvPr id="51" name="Rounded Rectangle 50">
               <a:extLst>
                 <a:ext uri="{FF2B5EF4-FFF2-40B4-BE49-F238E27FC236}">
-                  <a16:creationId xmlns:a16="http://schemas.microsoft.com/office/drawing/2014/main" id="{2AC1C8A6-F183-E444-9597-DA581FD927C3}"/>
+                  <a16:creationId xmlns:a16="http://schemas.microsoft.com/office/drawing/2014/main" id="{0EDEBD5B-391C-B841-A734-2894518CF9D7}"/>
                 </a:ext>
               </a:extLst>
             </p:cNvPr>
@@ -15825,16 +16201,16 @@
         </p:sp>
         <p:cxnSp>
           <p:nvCxnSpPr>
-            <p:cNvPr id="41" name="Straight Arrow Connector 40">
+            <p:cNvPr id="52" name="Straight Arrow Connector 51">
               <a:extLst>
                 <a:ext uri="{FF2B5EF4-FFF2-40B4-BE49-F238E27FC236}">
-                  <a16:creationId xmlns:a16="http://schemas.microsoft.com/office/drawing/2014/main" id="{1945EB48-4F05-8D4B-B52B-69C7C55C56C2}"/>
+                  <a16:creationId xmlns:a16="http://schemas.microsoft.com/office/drawing/2014/main" id="{7A4C1EDC-A380-084A-98DD-AE7A5EA2B081}"/>
                 </a:ext>
               </a:extLst>
             </p:cNvPr>
             <p:cNvCxnSpPr>
               <a:cxnSpLocks/>
-              <a:stCxn id="40" idx="2"/>
+              <a:stCxn id="51" idx="2"/>
             </p:cNvCxnSpPr>
             <p:nvPr/>
           </p:nvCxnSpPr>
@@ -15874,7 +16250,7 @@
     </p:spTree>
     <p:extLst>
       <p:ext uri="{BB962C8B-B14F-4D97-AF65-F5344CB8AC3E}">
-        <p14:creationId xmlns:p14="http://schemas.microsoft.com/office/powerpoint/2010/main" val="120361920"/>
+        <p14:creationId xmlns:p14="http://schemas.microsoft.com/office/powerpoint/2010/main" val="1054614681"/>
       </p:ext>
     </p:extLst>
   </p:cSld>
@@ -17062,10 +17438,132 @@
           </p:style>
         </p:cxnSp>
       </p:grpSp>
+      <p:grpSp>
+        <p:nvGrpSpPr>
+          <p:cNvPr id="50" name="Group 49">
+            <a:extLst>
+              <a:ext uri="{FF2B5EF4-FFF2-40B4-BE49-F238E27FC236}">
+                <a16:creationId xmlns:a16="http://schemas.microsoft.com/office/drawing/2014/main" id="{E24CDCE6-0D93-FD4B-9087-66B88C42CC31}"/>
+              </a:ext>
+            </a:extLst>
+          </p:cNvPr>
+          <p:cNvGrpSpPr/>
+          <p:nvPr/>
+        </p:nvGrpSpPr>
+        <p:grpSpPr>
+          <a:xfrm>
+            <a:off x="3589739" y="32910"/>
+            <a:ext cx="634823" cy="528612"/>
+            <a:chOff x="4970187" y="25451"/>
+            <a:chExt cx="923060" cy="528612"/>
+          </a:xfrm>
+        </p:grpSpPr>
+        <p:sp>
+          <p:nvSpPr>
+            <p:cNvPr id="51" name="Rounded Rectangle 50">
+              <a:extLst>
+                <a:ext uri="{FF2B5EF4-FFF2-40B4-BE49-F238E27FC236}">
+                  <a16:creationId xmlns:a16="http://schemas.microsoft.com/office/drawing/2014/main" id="{0EDEBD5B-391C-B841-A734-2894518CF9D7}"/>
+                </a:ext>
+              </a:extLst>
+            </p:cNvPr>
+            <p:cNvSpPr/>
+            <p:nvPr/>
+          </p:nvSpPr>
+          <p:spPr>
+            <a:xfrm>
+              <a:off x="4970187" y="25451"/>
+              <a:ext cx="923060" cy="402000"/>
+            </a:xfrm>
+            <a:prstGeom prst="roundRect">
+              <a:avLst/>
+            </a:prstGeom>
+            <a:noFill/>
+          </p:spPr>
+          <p:style>
+            <a:lnRef idx="2">
+              <a:schemeClr val="accent1">
+                <a:shade val="50000"/>
+              </a:schemeClr>
+            </a:lnRef>
+            <a:fillRef idx="1">
+              <a:schemeClr val="accent1"/>
+            </a:fillRef>
+            <a:effectRef idx="0">
+              <a:schemeClr val="accent1"/>
+            </a:effectRef>
+            <a:fontRef idx="minor">
+              <a:schemeClr val="lt1"/>
+            </a:fontRef>
+          </p:style>
+          <p:txBody>
+            <a:bodyPr rtlCol="0" anchor="ctr"/>
+            <a:lstStyle/>
+            <a:p>
+              <a:pPr algn="ctr"/>
+              <a:r>
+                <a:rPr lang="en-US" sz="1400" dirty="0">
+                  <a:solidFill>
+                    <a:schemeClr val="tx1"/>
+                  </a:solidFill>
+                </a:rPr>
+                <a:t>SM1</a:t>
+              </a:r>
+            </a:p>
+          </p:txBody>
+        </p:sp>
+        <p:cxnSp>
+          <p:nvCxnSpPr>
+            <p:cNvPr id="52" name="Straight Arrow Connector 51">
+              <a:extLst>
+                <a:ext uri="{FF2B5EF4-FFF2-40B4-BE49-F238E27FC236}">
+                  <a16:creationId xmlns:a16="http://schemas.microsoft.com/office/drawing/2014/main" id="{7A4C1EDC-A380-084A-98DD-AE7A5EA2B081}"/>
+                </a:ext>
+              </a:extLst>
+            </p:cNvPr>
+            <p:cNvCxnSpPr>
+              <a:cxnSpLocks/>
+              <a:stCxn id="51" idx="2"/>
+            </p:cNvCxnSpPr>
+            <p:nvPr/>
+          </p:nvCxnSpPr>
+          <p:spPr>
+            <a:xfrm>
+              <a:off x="5431718" y="427451"/>
+              <a:ext cx="0" cy="126612"/>
+            </a:xfrm>
+            <a:prstGeom prst="straightConnector1">
+              <a:avLst/>
+            </a:prstGeom>
+            <a:ln>
+              <a:solidFill>
+                <a:schemeClr val="accent1">
+                  <a:lumMod val="50000"/>
+                </a:schemeClr>
+              </a:solidFill>
+              <a:tailEnd type="triangle"/>
+            </a:ln>
+          </p:spPr>
+          <p:style>
+            <a:lnRef idx="1">
+              <a:schemeClr val="accent1"/>
+            </a:lnRef>
+            <a:fillRef idx="0">
+              <a:schemeClr val="accent1"/>
+            </a:fillRef>
+            <a:effectRef idx="0">
+              <a:schemeClr val="accent1"/>
+            </a:effectRef>
+            <a:fontRef idx="minor">
+              <a:schemeClr val="tx1"/>
+            </a:fontRef>
+          </p:style>
+        </p:cxnSp>
+      </p:grpSp>
     </p:spTree>
     <p:extLst>
       <p:ext uri="{BB962C8B-B14F-4D97-AF65-F5344CB8AC3E}">
-        <p14:creationId xmlns:p14="http://schemas.microsoft.com/office/powerpoint/2010/main" val="1727794124"/>
+        <p14:creationId xmlns:p14="http://schemas.microsoft.com/office/powerpoint/2010/main" val="849762444"/>
       </p:ext>
     </p:extLst>
   </p:cSld>
@@ -18446,10 +18944,132 @@
           </p:style>
         </p:cxnSp>
       </p:grpSp>
+      <p:grpSp>
+        <p:nvGrpSpPr>
+          <p:cNvPr id="50" name="Group 49">
+            <a:extLst>
+              <a:ext uri="{FF2B5EF4-FFF2-40B4-BE49-F238E27FC236}">
+                <a16:creationId xmlns:a16="http://schemas.microsoft.com/office/drawing/2014/main" id="{E24CDCE6-0D93-FD4B-9087-66B88C42CC31}"/>
+              </a:ext>
+            </a:extLst>
+          </p:cNvPr>
+          <p:cNvGrpSpPr/>
+          <p:nvPr/>
+        </p:nvGrpSpPr>
+        <p:grpSpPr>
+          <a:xfrm>
+            <a:off x="3589739" y="32910"/>
+            <a:ext cx="634823" cy="528612"/>
+            <a:chOff x="4970187" y="25451"/>
+            <a:chExt cx="923060" cy="528612"/>
+          </a:xfrm>
+        </p:grpSpPr>
+        <p:sp>
+          <p:nvSpPr>
+            <p:cNvPr id="51" name="Rounded Rectangle 50">
+              <a:extLst>
+                <a:ext uri="{FF2B5EF4-FFF2-40B4-BE49-F238E27FC236}">
+                  <a16:creationId xmlns:a16="http://schemas.microsoft.com/office/drawing/2014/main" id="{0EDEBD5B-391C-B841-A734-2894518CF9D7}"/>
+                </a:ext>
+              </a:extLst>
+            </p:cNvPr>
+            <p:cNvSpPr/>
+            <p:nvPr/>
+          </p:nvSpPr>
+          <p:spPr>
+            <a:xfrm>
+              <a:off x="4970187" y="25451"/>
+              <a:ext cx="923060" cy="402000"/>
+            </a:xfrm>
+            <a:prstGeom prst="roundRect">
+              <a:avLst/>
+            </a:prstGeom>
+            <a:noFill/>
+          </p:spPr>
+          <p:style>
+            <a:lnRef idx="2">
+              <a:schemeClr val="accent1">
+                <a:shade val="50000"/>
+              </a:schemeClr>
+            </a:lnRef>
+            <a:fillRef idx="1">
+              <a:schemeClr val="accent1"/>
+            </a:fillRef>
+            <a:effectRef idx="0">
+              <a:schemeClr val="accent1"/>
+            </a:effectRef>
+            <a:fontRef idx="minor">
+              <a:schemeClr val="lt1"/>
+            </a:fontRef>
+          </p:style>
+          <p:txBody>
+            <a:bodyPr rtlCol="0" anchor="ctr"/>
+            <a:lstStyle/>
+            <a:p>
+              <a:pPr algn="ctr"/>
+              <a:r>
+                <a:rPr lang="en-US" sz="1400" dirty="0">
+                  <a:solidFill>
+                    <a:schemeClr val="tx1"/>
+                  </a:solidFill>
+                </a:rPr>
+                <a:t>SM1</a:t>
+              </a:r>
+            </a:p>
+          </p:txBody>
+        </p:sp>
+        <p:cxnSp>
+          <p:nvCxnSpPr>
+            <p:cNvPr id="52" name="Straight Arrow Connector 51">
+              <a:extLst>
+                <a:ext uri="{FF2B5EF4-FFF2-40B4-BE49-F238E27FC236}">
+                  <a16:creationId xmlns:a16="http://schemas.microsoft.com/office/drawing/2014/main" id="{7A4C1EDC-A380-084A-98DD-AE7A5EA2B081}"/>
+                </a:ext>
+              </a:extLst>
+            </p:cNvPr>
+            <p:cNvCxnSpPr>
+              <a:cxnSpLocks/>
+              <a:stCxn id="51" idx="2"/>
+            </p:cNvCxnSpPr>
+            <p:nvPr/>
+          </p:nvCxnSpPr>
+          <p:spPr>
+            <a:xfrm>
+              <a:off x="5431718" y="427451"/>
+              <a:ext cx="0" cy="126612"/>
+            </a:xfrm>
+            <a:prstGeom prst="straightConnector1">
+              <a:avLst/>
+            </a:prstGeom>
+            <a:ln>
+              <a:solidFill>
+                <a:schemeClr val="accent1">
+                  <a:lumMod val="50000"/>
+                </a:schemeClr>
+              </a:solidFill>
+              <a:tailEnd type="triangle"/>
+            </a:ln>
+          </p:spPr>
+          <p:style>
+            <a:lnRef idx="1">
+              <a:schemeClr val="accent1"/>
+            </a:lnRef>
+            <a:fillRef idx="0">
+              <a:schemeClr val="accent1"/>
+            </a:fillRef>
+            <a:effectRef idx="0">
+              <a:schemeClr val="accent1"/>
+            </a:effectRef>
+            <a:fontRef idx="minor">
+              <a:schemeClr val="tx1"/>
+            </a:fontRef>
+          </p:style>
+        </p:cxnSp>
+      </p:grpSp>
     </p:spTree>
     <p:extLst>
       <p:ext uri="{BB962C8B-B14F-4D97-AF65-F5344CB8AC3E}">
-        <p14:creationId xmlns:p14="http://schemas.microsoft.com/office/powerpoint/2010/main" val="2103568784"/>
+        <p14:creationId xmlns:p14="http://schemas.microsoft.com/office/powerpoint/2010/main" val="1610859494"/>
       </p:ext>
     </p:extLst>
   </p:cSld>
@@ -20066,10 +20686,132 @@
           </p:txBody>
         </p:sp>
       </p:grpSp>
+      <p:grpSp>
+        <p:nvGrpSpPr>
+          <p:cNvPr id="50" name="Group 49">
+            <a:extLst>
+              <a:ext uri="{FF2B5EF4-FFF2-40B4-BE49-F238E27FC236}">
+                <a16:creationId xmlns:a16="http://schemas.microsoft.com/office/drawing/2014/main" id="{E24CDCE6-0D93-FD4B-9087-66B88C42CC31}"/>
+              </a:ext>
+            </a:extLst>
+          </p:cNvPr>
+          <p:cNvGrpSpPr/>
+          <p:nvPr/>
+        </p:nvGrpSpPr>
+        <p:grpSpPr>
+          <a:xfrm>
+            <a:off x="3589739" y="32910"/>
+            <a:ext cx="634823" cy="528612"/>
+            <a:chOff x="4970187" y="25451"/>
+            <a:chExt cx="923060" cy="528612"/>
+          </a:xfrm>
+        </p:grpSpPr>
+        <p:sp>
+          <p:nvSpPr>
+            <p:cNvPr id="51" name="Rounded Rectangle 50">
+              <a:extLst>
+                <a:ext uri="{FF2B5EF4-FFF2-40B4-BE49-F238E27FC236}">
+                  <a16:creationId xmlns:a16="http://schemas.microsoft.com/office/drawing/2014/main" id="{0EDEBD5B-391C-B841-A734-2894518CF9D7}"/>
+                </a:ext>
+              </a:extLst>
+            </p:cNvPr>
+            <p:cNvSpPr/>
+            <p:nvPr/>
+          </p:nvSpPr>
+          <p:spPr>
+            <a:xfrm>
+              <a:off x="4970187" y="25451"/>
+              <a:ext cx="923060" cy="402000"/>
+            </a:xfrm>
+            <a:prstGeom prst="roundRect">
+              <a:avLst/>
+            </a:prstGeom>
+            <a:noFill/>
+          </p:spPr>
+          <p:style>
+            <a:lnRef idx="2">
+              <a:schemeClr val="accent1">
+                <a:shade val="50000"/>
+              </a:schemeClr>
+            </a:lnRef>
+            <a:fillRef idx="1">
+              <a:schemeClr val="accent1"/>
+            </a:fillRef>
+            <a:effectRef idx="0">
+              <a:schemeClr val="accent1"/>
+            </a:effectRef>
+            <a:fontRef idx="minor">
+              <a:schemeClr val="lt1"/>
+            </a:fontRef>
+          </p:style>
+          <p:txBody>
+            <a:bodyPr rtlCol="0" anchor="ctr"/>
+            <a:lstStyle/>
+            <a:p>
+              <a:pPr algn="ctr"/>
+              <a:r>
+                <a:rPr lang="en-US" sz="1400" dirty="0">
+                  <a:solidFill>
+                    <a:schemeClr val="tx1"/>
+                  </a:solidFill>
+                </a:rPr>
+                <a:t>SM1</a:t>
+              </a:r>
+            </a:p>
+          </p:txBody>
+        </p:sp>
+        <p:cxnSp>
+          <p:nvCxnSpPr>
+            <p:cNvPr id="52" name="Straight Arrow Connector 51">
+              <a:extLst>
+                <a:ext uri="{FF2B5EF4-FFF2-40B4-BE49-F238E27FC236}">
+                  <a16:creationId xmlns:a16="http://schemas.microsoft.com/office/drawing/2014/main" id="{7A4C1EDC-A380-084A-98DD-AE7A5EA2B081}"/>
+                </a:ext>
+              </a:extLst>
+            </p:cNvPr>
+            <p:cNvCxnSpPr>
+              <a:cxnSpLocks/>
+              <a:stCxn id="51" idx="2"/>
+            </p:cNvCxnSpPr>
+            <p:nvPr/>
+          </p:nvCxnSpPr>
+          <p:spPr>
+            <a:xfrm>
+              <a:off x="5431718" y="427451"/>
+              <a:ext cx="0" cy="126612"/>
+            </a:xfrm>
+            <a:prstGeom prst="straightConnector1">
+              <a:avLst/>
+            </a:prstGeom>
+            <a:ln>
+              <a:solidFill>
+                <a:schemeClr val="accent1">
+                  <a:lumMod val="50000"/>
+                </a:schemeClr>
+              </a:solidFill>
+              <a:tailEnd type="triangle"/>
+            </a:ln>
+          </p:spPr>
+          <p:style>
+            <a:lnRef idx="1">
+              <a:schemeClr val="accent1"/>
+            </a:lnRef>
+            <a:fillRef idx="0">
+              <a:schemeClr val="accent1"/>
+            </a:fillRef>
+            <a:effectRef idx="0">
+              <a:schemeClr val="accent1"/>
+            </a:effectRef>
+            <a:fontRef idx="minor">
+              <a:schemeClr val="tx1"/>
+            </a:fontRef>
+          </p:style>
+        </p:cxnSp>
+      </p:grpSp>
     </p:spTree>
     <p:extLst>
       <p:ext uri="{BB962C8B-B14F-4D97-AF65-F5344CB8AC3E}">
-        <p14:creationId xmlns:p14="http://schemas.microsoft.com/office/powerpoint/2010/main" val="3327993568"/>
+        <p14:creationId xmlns:p14="http://schemas.microsoft.com/office/powerpoint/2010/main" val="2415724041"/>
       </p:ext>
     </p:extLst>
   </p:cSld>
@@ -21922,10 +22664,132 @@
           </p:txBody>
         </p:sp>
       </p:grpSp>
+      <p:grpSp>
+        <p:nvGrpSpPr>
+          <p:cNvPr id="50" name="Group 49">
+            <a:extLst>
+              <a:ext uri="{FF2B5EF4-FFF2-40B4-BE49-F238E27FC236}">
+                <a16:creationId xmlns:a16="http://schemas.microsoft.com/office/drawing/2014/main" id="{E24CDCE6-0D93-FD4B-9087-66B88C42CC31}"/>
+              </a:ext>
+            </a:extLst>
+          </p:cNvPr>
+          <p:cNvGrpSpPr/>
+          <p:nvPr/>
+        </p:nvGrpSpPr>
+        <p:grpSpPr>
+          <a:xfrm>
+            <a:off x="3589739" y="32910"/>
+            <a:ext cx="634823" cy="528612"/>
+            <a:chOff x="4970187" y="25451"/>
+            <a:chExt cx="923060" cy="528612"/>
+          </a:xfrm>
+        </p:grpSpPr>
+        <p:sp>
+          <p:nvSpPr>
+            <p:cNvPr id="51" name="Rounded Rectangle 50">
+              <a:extLst>
+                <a:ext uri="{FF2B5EF4-FFF2-40B4-BE49-F238E27FC236}">
+                  <a16:creationId xmlns:a16="http://schemas.microsoft.com/office/drawing/2014/main" id="{0EDEBD5B-391C-B841-A734-2894518CF9D7}"/>
+                </a:ext>
+              </a:extLst>
+            </p:cNvPr>
+            <p:cNvSpPr/>
+            <p:nvPr/>
+          </p:nvSpPr>
+          <p:spPr>
+            <a:xfrm>
+              <a:off x="4970187" y="25451"/>
+              <a:ext cx="923060" cy="402000"/>
+            </a:xfrm>
+            <a:prstGeom prst="roundRect">
+              <a:avLst/>
+            </a:prstGeom>
+            <a:noFill/>
+          </p:spPr>
+          <p:style>
+            <a:lnRef idx="2">
+              <a:schemeClr val="accent1">
+                <a:shade val="50000"/>
+              </a:schemeClr>
+            </a:lnRef>
+            <a:fillRef idx="1">
+              <a:schemeClr val="accent1"/>
+            </a:fillRef>
+            <a:effectRef idx="0">
+              <a:schemeClr val="accent1"/>
+            </a:effectRef>
+            <a:fontRef idx="minor">
+              <a:schemeClr val="lt1"/>
+            </a:fontRef>
+          </p:style>
+          <p:txBody>
+            <a:bodyPr rtlCol="0" anchor="ctr"/>
+            <a:lstStyle/>
+            <a:p>
+              <a:pPr algn="ctr"/>
+              <a:r>
+                <a:rPr lang="en-US" sz="1400" dirty="0">
+                  <a:solidFill>
+                    <a:schemeClr val="tx1"/>
+                  </a:solidFill>
+                </a:rPr>
+                <a:t>SM1</a:t>
+              </a:r>
+            </a:p>
+          </p:txBody>
+        </p:sp>
+        <p:cxnSp>
+          <p:nvCxnSpPr>
+            <p:cNvPr id="52" name="Straight Arrow Connector 51">
+              <a:extLst>
+                <a:ext uri="{FF2B5EF4-FFF2-40B4-BE49-F238E27FC236}">
+                  <a16:creationId xmlns:a16="http://schemas.microsoft.com/office/drawing/2014/main" id="{7A4C1EDC-A380-084A-98DD-AE7A5EA2B081}"/>
+                </a:ext>
+              </a:extLst>
+            </p:cNvPr>
+            <p:cNvCxnSpPr>
+              <a:cxnSpLocks/>
+              <a:stCxn id="51" idx="2"/>
+            </p:cNvCxnSpPr>
+            <p:nvPr/>
+          </p:nvCxnSpPr>
+          <p:spPr>
+            <a:xfrm>
+              <a:off x="5431718" y="427451"/>
+              <a:ext cx="0" cy="126612"/>
+            </a:xfrm>
+            <a:prstGeom prst="straightConnector1">
+              <a:avLst/>
+            </a:prstGeom>
+            <a:ln>
+              <a:solidFill>
+                <a:schemeClr val="accent1">
+                  <a:lumMod val="50000"/>
+                </a:schemeClr>
+              </a:solidFill>
+              <a:tailEnd type="triangle"/>
+            </a:ln>
+          </p:spPr>
+          <p:style>
+            <a:lnRef idx="1">
+              <a:schemeClr val="accent1"/>
+            </a:lnRef>
+            <a:fillRef idx="0">
+              <a:schemeClr val="accent1"/>
+            </a:fillRef>
+            <a:effectRef idx="0">
+              <a:schemeClr val="accent1"/>
+            </a:effectRef>
+            <a:fontRef idx="minor">
+              <a:schemeClr val="tx1"/>
+            </a:fontRef>
+          </p:style>
+        </p:cxnSp>
+      </p:grpSp>
     </p:spTree>
     <p:extLst>
       <p:ext uri="{BB962C8B-B14F-4D97-AF65-F5344CB8AC3E}">
-        <p14:creationId xmlns:p14="http://schemas.microsoft.com/office/powerpoint/2010/main" val="1298866869"/>
+        <p14:creationId xmlns:p14="http://schemas.microsoft.com/office/powerpoint/2010/main" val="1577776019"/>
       </p:ext>
     </p:extLst>
   </p:cSld>
@@ -24011,10 +24875,132 @@
           </p:txBody>
         </p:sp>
       </p:grpSp>
+      <p:grpSp>
+        <p:nvGrpSpPr>
+          <p:cNvPr id="50" name="Group 49">
+            <a:extLst>
+              <a:ext uri="{FF2B5EF4-FFF2-40B4-BE49-F238E27FC236}">
+                <a16:creationId xmlns:a16="http://schemas.microsoft.com/office/drawing/2014/main" id="{E24CDCE6-0D93-FD4B-9087-66B88C42CC31}"/>
+              </a:ext>
+            </a:extLst>
+          </p:cNvPr>
+          <p:cNvGrpSpPr/>
+          <p:nvPr/>
+        </p:nvGrpSpPr>
+        <p:grpSpPr>
+          <a:xfrm>
+            <a:off x="3589739" y="32910"/>
+            <a:ext cx="634823" cy="528612"/>
+            <a:chOff x="4970187" y="25451"/>
+            <a:chExt cx="923060" cy="528612"/>
+          </a:xfrm>
+        </p:grpSpPr>
+        <p:sp>
+          <p:nvSpPr>
+            <p:cNvPr id="51" name="Rounded Rectangle 50">
+              <a:extLst>
+                <a:ext uri="{FF2B5EF4-FFF2-40B4-BE49-F238E27FC236}">
+                  <a16:creationId xmlns:a16="http://schemas.microsoft.com/office/drawing/2014/main" id="{0EDEBD5B-391C-B841-A734-2894518CF9D7}"/>
+                </a:ext>
+              </a:extLst>
+            </p:cNvPr>
+            <p:cNvSpPr/>
+            <p:nvPr/>
+          </p:nvSpPr>
+          <p:spPr>
+            <a:xfrm>
+              <a:off x="4970187" y="25451"/>
+              <a:ext cx="923060" cy="402000"/>
+            </a:xfrm>
+            <a:prstGeom prst="roundRect">
+              <a:avLst/>
+            </a:prstGeom>
+            <a:noFill/>
+          </p:spPr>
+          <p:style>
+            <a:lnRef idx="2">
+              <a:schemeClr val="accent1">
+                <a:shade val="50000"/>
+              </a:schemeClr>
+            </a:lnRef>
+            <a:fillRef idx="1">
+              <a:schemeClr val="accent1"/>
+            </a:fillRef>
+            <a:effectRef idx="0">
+              <a:schemeClr val="accent1"/>
+            </a:effectRef>
+            <a:fontRef idx="minor">
+              <a:schemeClr val="lt1"/>
+            </a:fontRef>
+          </p:style>
+          <p:txBody>
+            <a:bodyPr rtlCol="0" anchor="ctr"/>
+            <a:lstStyle/>
+            <a:p>
+              <a:pPr algn="ctr"/>
+              <a:r>
+                <a:rPr lang="en-US" sz="1400" dirty="0">
+                  <a:solidFill>
+                    <a:schemeClr val="tx1"/>
+                  </a:solidFill>
+                </a:rPr>
+                <a:t>SM1</a:t>
+              </a:r>
+            </a:p>
+          </p:txBody>
+        </p:sp>
+        <p:cxnSp>
+          <p:nvCxnSpPr>
+            <p:cNvPr id="52" name="Straight Arrow Connector 51">
+              <a:extLst>
+                <a:ext uri="{FF2B5EF4-FFF2-40B4-BE49-F238E27FC236}">
+                  <a16:creationId xmlns:a16="http://schemas.microsoft.com/office/drawing/2014/main" id="{7A4C1EDC-A380-084A-98DD-AE7A5EA2B081}"/>
+                </a:ext>
+              </a:extLst>
+            </p:cNvPr>
+            <p:cNvCxnSpPr>
+              <a:cxnSpLocks/>
+              <a:stCxn id="51" idx="2"/>
+            </p:cNvCxnSpPr>
+            <p:nvPr/>
+          </p:nvCxnSpPr>
+          <p:spPr>
+            <a:xfrm>
+              <a:off x="5431718" y="427451"/>
+              <a:ext cx="0" cy="126612"/>
+            </a:xfrm>
+            <a:prstGeom prst="straightConnector1">
+              <a:avLst/>
+            </a:prstGeom>
+            <a:ln>
+              <a:solidFill>
+                <a:schemeClr val="accent1">
+                  <a:lumMod val="50000"/>
+                </a:schemeClr>
+              </a:solidFill>
+              <a:tailEnd type="triangle"/>
+            </a:ln>
+          </p:spPr>
+          <p:style>
+            <a:lnRef idx="1">
+              <a:schemeClr val="accent1"/>
+            </a:lnRef>
+            <a:fillRef idx="0">
+              <a:schemeClr val="accent1"/>
+            </a:fillRef>
+            <a:effectRef idx="0">
+              <a:schemeClr val="accent1"/>
+            </a:effectRef>
+            <a:fontRef idx="minor">
+              <a:schemeClr val="tx1"/>
+            </a:fontRef>
+          </p:style>
+        </p:cxnSp>
+      </p:grpSp>
     </p:spTree>
     <p:extLst>
       <p:ext uri="{BB962C8B-B14F-4D97-AF65-F5344CB8AC3E}">
-        <p14:creationId xmlns:p14="http://schemas.microsoft.com/office/powerpoint/2010/main" val="965000264"/>
+        <p14:creationId xmlns:p14="http://schemas.microsoft.com/office/powerpoint/2010/main" val="1477808440"/>
       </p:ext>
     </p:extLst>
   </p:cSld>

</xml_diff>